<commit_message>
Up to slide 4 complete
</commit_message>
<xml_diff>
--- a/2 - Info/Notesort presentation.pptx
+++ b/2 - Info/Notesort presentation.pptx
@@ -10627,8 +10627,8 @@
       </p:transition>
     </mc:Fallback>
   </mc:AlternateContent>
-  <mc:AlternateContent xmlns:mc="http://schemas.openxmlformats.org/markup-compatibility/2006">
-    <mc:Choice xmlns:p14="http://schemas.microsoft.com/office/powerpoint/2010/main" Requires="p14">
+  <mc:AlternateContent xmlns:mc="http://schemas.openxmlformats.org/markup-compatibility/2006" xmlns:p14="http://schemas.microsoft.com/office/powerpoint/2010/main">
+    <mc:Choice Requires="p14">
       <p:timing>
         <p:tnLst>
           <p:par>
@@ -11506,7 +11506,7 @@
         </p:bldLst>
       </p:timing>
     </mc:Choice>
-    <mc:Fallback>
+    <mc:Fallback xmlns="">
       <p:timing>
         <p:tnLst>
           <p:par>

</xml_diff>

<commit_message>
All slides are made, but can be polished
</commit_message>
<xml_diff>
--- a/2 - Info/Notesort presentation.pptx
+++ b/2 - Info/Notesort presentation.pptx
@@ -5,7 +5,7 @@
     <p:sldMasterId id="2147483674" r:id="rId1"/>
   </p:sldMasterIdLst>
   <p:notesMasterIdLst>
-    <p:notesMasterId r:id="rId9"/>
+    <p:notesMasterId r:id="rId10"/>
   </p:notesMasterIdLst>
   <p:sldIdLst>
     <p:sldId id="324" r:id="rId2"/>
@@ -13,8 +13,9 @@
     <p:sldId id="268" r:id="rId4"/>
     <p:sldId id="279" r:id="rId5"/>
     <p:sldId id="309" r:id="rId6"/>
-    <p:sldId id="325" r:id="rId7"/>
-    <p:sldId id="323" r:id="rId8"/>
+    <p:sldId id="326" r:id="rId7"/>
+    <p:sldId id="325" r:id="rId8"/>
+    <p:sldId id="323" r:id="rId9"/>
   </p:sldIdLst>
   <p:sldSz cx="12192000" cy="6858000"/>
   <p:notesSz cx="6858000" cy="9144000"/>
@@ -234,7 +235,7 @@
           <a:p>
             <a:fld id="{CD2D63DA-F1A7-462C-BE44-8E8D77DA3BA5}" type="datetimeFigureOut">
               <a:rPr lang="da-DK" smtClean="0"/>
-              <a:t>08-06-2020</a:t>
+              <a:t>10-06-2020</a:t>
             </a:fld>
             <a:endParaRPr lang="da-DK"/>
           </a:p>
@@ -12963,7 +12964,7 @@
         <p:spPr>
           <a:xfrm>
             <a:off x="1565835" y="1936376"/>
-            <a:ext cx="8420847" cy="2031325"/>
+            <a:ext cx="8420847" cy="369332"/>
           </a:xfrm>
           <a:prstGeom prst="rect">
             <a:avLst/>
@@ -12982,50 +12983,41 @@
             </a:pPr>
             <a:r>
               <a:rPr lang="da-DK" dirty="0"/>
-              <a:t>Test af iterationer</a:t>
+              <a:t>Test af iterationer – er brugerhistorien opfyldt?</a:t>
             </a:r>
-            <a:br>
-              <a:rPr lang="da-DK" dirty="0"/>
-            </a:br>
-            <a:endParaRPr lang="da-DK" dirty="0"/>
-          </a:p>
-          <a:p>
-            <a:pPr marL="285750" indent="-285750">
-              <a:buFont typeface="Wingdings" panose="05000000000000000000" pitchFamily="2" charset="2"/>
-              <a:buChar char="v"/>
-            </a:pPr>
-            <a:r>
-              <a:rPr lang="da-DK" dirty="0"/>
-              <a:t>Sideløbende tests – test af idéer i en ”test.</a:t>
-            </a:r>
-            <a:r>
-              <a:rPr lang="da-DK"/>
-              <a:t>py”-fil</a:t>
-            </a:r>
-            <a:br>
-              <a:rPr lang="da-DK"/>
-            </a:br>
-            <a:endParaRPr lang="da-DK"/>
-          </a:p>
-          <a:p>
-            <a:pPr marL="285750" indent="-285750">
-              <a:buFont typeface="Wingdings" panose="05000000000000000000" pitchFamily="2" charset="2"/>
-              <a:buChar char="v"/>
-            </a:pPr>
-            <a:br>
-              <a:rPr lang="da-DK" dirty="0"/>
-            </a:br>
-            <a:endParaRPr lang="da-DK" dirty="0"/>
-          </a:p>
-          <a:p>
-            <a:pPr marL="285750" indent="-285750">
-              <a:buFont typeface="Wingdings" panose="05000000000000000000" pitchFamily="2" charset="2"/>
-              <a:buChar char="v"/>
-            </a:pPr>
-            <a:endParaRPr lang="da-DK" dirty="0"/>
-          </a:p>
-        </p:txBody>
-      </p:sp>
+          </a:p>
+        </p:txBody>
+      </p:sp>
+      <p:pic>
+        <p:nvPicPr>
+          <p:cNvPr id="2" name="Picture 1">
+            <a:extLst>
+              <a:ext uri="{FF2B5EF4-FFF2-40B4-BE49-F238E27FC236}">
+                <a16:creationId xmlns:a16="http://schemas.microsoft.com/office/drawing/2014/main" id="{FD258250-3E7F-401F-A60A-BB79528ECA55}"/>
+              </a:ext>
+            </a:extLst>
+          </p:cNvPr>
+          <p:cNvPicPr>
+            <a:picLocks noChangeAspect="1"/>
+          </p:cNvPicPr>
+          <p:nvPr/>
+        </p:nvPicPr>
+        <p:blipFill>
+          <a:blip r:embed="rId2"/>
+          <a:stretch>
+            <a:fillRect/>
+          </a:stretch>
+        </p:blipFill>
+        <p:spPr>
+          <a:xfrm>
+            <a:off x="2383033" y="2474752"/>
+            <a:ext cx="7425932" cy="3254128"/>
+          </a:xfrm>
+          <a:prstGeom prst="rect">
+            <a:avLst/>
+          </a:prstGeom>
+        </p:spPr>
+      </p:pic>
     </p:spTree>
     <p:extLst>
       <p:ext uri="{BB962C8B-B14F-4D97-AF65-F5344CB8AC3E}">
@@ -13100,11 +13092,256 @@
                   <a:schemeClr val="accent1"/>
                 </a:solidFill>
               </a:rPr>
+              <a:t>Test af programmet</a:t>
+            </a:r>
+          </a:p>
+        </p:txBody>
+      </p:sp>
+      <p:sp>
+        <p:nvSpPr>
+          <p:cNvPr id="3" name="TextBox 2">
+            <a:extLst>
+              <a:ext uri="{FF2B5EF4-FFF2-40B4-BE49-F238E27FC236}">
+                <a16:creationId xmlns:a16="http://schemas.microsoft.com/office/drawing/2014/main" id="{75C57614-2FB8-4657-8ED5-BEA0D32B6813}"/>
+              </a:ext>
+            </a:extLst>
+          </p:cNvPr>
+          <p:cNvSpPr txBox="1"/>
+          <p:nvPr/>
+        </p:nvSpPr>
+        <p:spPr>
+          <a:xfrm>
+            <a:off x="1565835" y="1936376"/>
+            <a:ext cx="8420847" cy="369332"/>
+          </a:xfrm>
+          <a:prstGeom prst="rect">
+            <a:avLst/>
+          </a:prstGeom>
+          <a:noFill/>
+        </p:spPr>
+        <p:txBody>
+          <a:bodyPr wrap="square" rtlCol="0">
+            <a:spAutoFit/>
+          </a:bodyPr>
+          <a:lstStyle/>
+          <a:p>
+            <a:pPr marL="285750" indent="-285750">
+              <a:buFont typeface="Wingdings" panose="05000000000000000000" pitchFamily="2" charset="2"/>
+              <a:buChar char="v"/>
+            </a:pPr>
+            <a:r>
+              <a:rPr lang="da-DK" dirty="0"/>
+              <a:t>Sideløbende tests – test af idéer i en ”test.py”-fil</a:t>
+            </a:r>
+          </a:p>
+        </p:txBody>
+      </p:sp>
+      <p:pic>
+        <p:nvPicPr>
+          <p:cNvPr id="6" name="Picture 5" descr="A screenshot of a cell phone&#10;&#10;Description automatically generated">
+            <a:extLst>
+              <a:ext uri="{FF2B5EF4-FFF2-40B4-BE49-F238E27FC236}">
+                <a16:creationId xmlns:a16="http://schemas.microsoft.com/office/drawing/2014/main" id="{12EE3653-3412-482A-B712-664412D7CC35}"/>
+              </a:ext>
+            </a:extLst>
+          </p:cNvPr>
+          <p:cNvPicPr>
+            <a:picLocks noChangeAspect="1"/>
+          </p:cNvPicPr>
+          <p:nvPr/>
+        </p:nvPicPr>
+        <p:blipFill>
+          <a:blip r:embed="rId2">
+            <a:extLst>
+              <a:ext uri="{28A0092B-C50C-407E-A947-70E740481C1C}">
+                <a14:useLocalDpi xmlns:a14="http://schemas.microsoft.com/office/drawing/2010/main" val="0"/>
+              </a:ext>
+            </a:extLst>
+          </a:blip>
+          <a:stretch>
+            <a:fillRect/>
+          </a:stretch>
+        </p:blipFill>
+        <p:spPr>
+          <a:xfrm>
+            <a:off x="3719117" y="2554722"/>
+            <a:ext cx="4753764" cy="3857060"/>
+          </a:xfrm>
+          <a:prstGeom prst="rect">
+            <a:avLst/>
+          </a:prstGeom>
+        </p:spPr>
+      </p:pic>
+    </p:spTree>
+    <p:extLst>
+      <p:ext uri="{BB962C8B-B14F-4D97-AF65-F5344CB8AC3E}">
+        <p14:creationId xmlns:p14="http://schemas.microsoft.com/office/powerpoint/2010/main" val="2396163137"/>
+      </p:ext>
+    </p:extLst>
+  </p:cSld>
+  <p:clrMapOvr>
+    <a:masterClrMapping/>
+  </p:clrMapOvr>
+  <mc:AlternateContent xmlns:mc="http://schemas.openxmlformats.org/markup-compatibility/2006" xmlns:p14="http://schemas.microsoft.com/office/powerpoint/2010/main">
+    <mc:Choice Requires="p14">
+      <p:transition spd="med" p14:dur="700">
+        <p:fade/>
+      </p:transition>
+    </mc:Choice>
+    <mc:Fallback xmlns="">
+      <p:transition spd="med">
+        <p:fade/>
+      </p:transition>
+    </mc:Fallback>
+  </mc:AlternateContent>
+</p:sld>
+</file>
+
+<file path=ppt/slides/slide7.xml><?xml version="1.0" encoding="utf-8"?>
+<p:sld xmlns:a="http://schemas.openxmlformats.org/drawingml/2006/main" xmlns:r="http://schemas.openxmlformats.org/officeDocument/2006/relationships" xmlns:p="http://schemas.openxmlformats.org/presentationml/2006/main">
+  <p:cSld>
+    <p:spTree>
+      <p:nvGrpSpPr>
+        <p:cNvPr id="1" name=""/>
+        <p:cNvGrpSpPr/>
+        <p:nvPr/>
+      </p:nvGrpSpPr>
+      <p:grpSpPr>
+        <a:xfrm>
+          <a:off x="0" y="0"/>
+          <a:ext cx="0" cy="0"/>
+          <a:chOff x="0" y="0"/>
+          <a:chExt cx="0" cy="0"/>
+        </a:xfrm>
+      </p:grpSpPr>
+      <p:sp>
+        <p:nvSpPr>
+          <p:cNvPr id="28" name="Text Placeholder 27">
+            <a:extLst>
+              <a:ext uri="{FF2B5EF4-FFF2-40B4-BE49-F238E27FC236}">
+                <a16:creationId xmlns:a16="http://schemas.microsoft.com/office/drawing/2014/main" id="{DB49EC7C-3FF2-4661-98F5-83B2D8A96317}"/>
+              </a:ext>
+            </a:extLst>
+          </p:cNvPr>
+          <p:cNvSpPr>
+            <a:spLocks noGrp="1"/>
+          </p:cNvSpPr>
+          <p:nvPr>
+            <p:ph type="body" sz="quarter" idx="10"/>
+          </p:nvPr>
+        </p:nvSpPr>
+        <p:spPr>
+          <a:xfrm>
+            <a:off x="414444" y="446218"/>
+            <a:ext cx="11363111" cy="868846"/>
+          </a:xfrm>
+        </p:spPr>
+        <p:txBody>
+          <a:bodyPr/>
+          <a:lstStyle/>
+          <a:p>
+            <a:r>
+              <a:rPr lang="da-DK" sz="6600" dirty="0">
+                <a:solidFill>
+                  <a:schemeClr val="accent1"/>
+                </a:solidFill>
+              </a:rPr>
               <a:t>Fremtidige forbedringer</a:t>
             </a:r>
           </a:p>
         </p:txBody>
       </p:sp>
+      <p:sp>
+        <p:nvSpPr>
+          <p:cNvPr id="3" name="TextBox 2">
+            <a:extLst>
+              <a:ext uri="{FF2B5EF4-FFF2-40B4-BE49-F238E27FC236}">
+                <a16:creationId xmlns:a16="http://schemas.microsoft.com/office/drawing/2014/main" id="{C83643C6-08DE-41AE-AB15-E548D06308D0}"/>
+              </a:ext>
+            </a:extLst>
+          </p:cNvPr>
+          <p:cNvSpPr txBox="1"/>
+          <p:nvPr/>
+        </p:nvSpPr>
+        <p:spPr>
+          <a:xfrm>
+            <a:off x="1565835" y="1936376"/>
+            <a:ext cx="8420847" cy="1754326"/>
+          </a:xfrm>
+          <a:prstGeom prst="rect">
+            <a:avLst/>
+          </a:prstGeom>
+          <a:noFill/>
+        </p:spPr>
+        <p:txBody>
+          <a:bodyPr wrap="square" rtlCol="0">
+            <a:spAutoFit/>
+          </a:bodyPr>
+          <a:lstStyle/>
+          <a:p>
+            <a:pPr marL="285750" indent="-285750">
+              <a:buFont typeface="Wingdings" panose="05000000000000000000" pitchFamily="2" charset="2"/>
+              <a:buChar char="v"/>
+            </a:pPr>
+            <a:r>
+              <a:rPr lang="da-DK" dirty="0"/>
+              <a:t>Søgefunktion</a:t>
+            </a:r>
+            <a:br>
+              <a:rPr lang="da-DK" dirty="0"/>
+            </a:br>
+            <a:br>
+              <a:rPr lang="da-DK" dirty="0"/>
+            </a:br>
+            <a:br>
+              <a:rPr lang="da-DK" dirty="0"/>
+            </a:br>
+            <a:br>
+              <a:rPr lang="da-DK" dirty="0"/>
+            </a:br>
+            <a:endParaRPr lang="da-DK" dirty="0"/>
+          </a:p>
+          <a:p>
+            <a:pPr marL="285750" indent="-285750">
+              <a:buFont typeface="Wingdings" panose="05000000000000000000" pitchFamily="2" charset="2"/>
+              <a:buChar char="v"/>
+            </a:pPr>
+            <a:r>
+              <a:rPr lang="da-DK" dirty="0"/>
+              <a:t>Neurale netværk til sortering af noter</a:t>
+            </a:r>
+          </a:p>
+        </p:txBody>
+      </p:sp>
+      <p:pic>
+        <p:nvPicPr>
+          <p:cNvPr id="2" name="Picture 1">
+            <a:extLst>
+              <a:ext uri="{FF2B5EF4-FFF2-40B4-BE49-F238E27FC236}">
+                <a16:creationId xmlns:a16="http://schemas.microsoft.com/office/drawing/2014/main" id="{4FE7844C-BFF7-4CB1-9DCA-58769CCC7777}"/>
+              </a:ext>
+            </a:extLst>
+          </p:cNvPr>
+          <p:cNvPicPr>
+            <a:picLocks noChangeAspect="1"/>
+          </p:cNvPicPr>
+          <p:nvPr/>
+        </p:nvPicPr>
+        <p:blipFill rotWithShape="1">
+          <a:blip r:embed="rId2"/>
+          <a:srcRect l="44475" r="487" b="52923"/>
+          <a:stretch/>
+        </p:blipFill>
+        <p:spPr>
+          <a:xfrm>
+            <a:off x="7290033" y="2019744"/>
+            <a:ext cx="3649212" cy="1587590"/>
+          </a:xfrm>
+          <a:prstGeom prst="rect">
+            <a:avLst/>
+          </a:prstGeom>
+        </p:spPr>
+      </p:pic>
     </p:spTree>
     <p:extLst>
       <p:ext uri="{BB962C8B-B14F-4D97-AF65-F5344CB8AC3E}">
@@ -13130,7 +13367,7 @@
 </p:sld>
 </file>
 
-<file path=ppt/slides/slide7.xml><?xml version="1.0" encoding="utf-8"?>
+<file path=ppt/slides/slide8.xml><?xml version="1.0" encoding="utf-8"?>
 <p:sld xmlns:a="http://schemas.openxmlformats.org/drawingml/2006/main" xmlns:r="http://schemas.openxmlformats.org/officeDocument/2006/relationships" xmlns:p="http://schemas.openxmlformats.org/presentationml/2006/main">
   <p:cSld>
     <p:spTree>

</xml_diff>